<commit_message>
Overskrift 1) => Identifisering
</commit_message>
<xml_diff>
--- a/tjenestebeskrivelse/betal-fra-nettbank-datautveksling.pptx
+++ b/tjenestebeskrivelse/betal-fra-nettbank-datautveksling.pptx
@@ -7403,8 +7403,13 @@
                   <a:schemeClr val="tx2"/>
                 </a:solidFill>
               </a:rPr>
-              <a:t>Vaske kunderegister</a:t>
-            </a:r>
+              <a:t>Tilby kunde Digipost-faktura</a:t>
+            </a:r>
+            <a:endParaRPr lang="nb-NO" sz="1000" dirty="0" smtClean="0">
+              <a:solidFill>
+                <a:schemeClr val="tx2"/>
+              </a:solidFill>
+            </a:endParaRPr>
           </a:p>
         </p:txBody>
       </p:sp>
@@ -7455,8 +7460,8 @@
         </p:nvSpPr>
         <p:spPr>
           <a:xfrm>
-            <a:off x="1386667" y="1489094"/>
-            <a:ext cx="1284232" cy="492369"/>
+            <a:off x="1292518" y="1489096"/>
+            <a:ext cx="1408525" cy="492369"/>
           </a:xfrm>
           <a:prstGeom prst="rect">
             <a:avLst/>
@@ -7491,23 +7496,23 @@
                   <a:schemeClr val="tx2"/>
                 </a:solidFill>
               </a:rPr>
-              <a:t>1) </a:t>
-            </a:r>
-            <a:r>
-              <a:rPr lang="nb-NO" sz="1000" b="1" dirty="0" err="1" smtClean="0">
+              <a:t>1</a:t>
+            </a:r>
+            <a:r>
+              <a:rPr lang="nb-NO" sz="1000" b="1" smtClean="0">
                 <a:solidFill>
                   <a:schemeClr val="tx2"/>
                 </a:solidFill>
               </a:rPr>
-              <a:t>Initiell</a:t>
-            </a:r>
-            <a:r>
-              <a:rPr lang="nb-NO" sz="1000" b="1" dirty="0" smtClean="0">
+              <a:t>) </a:t>
+            </a:r>
+            <a:r>
+              <a:rPr lang="nb-NO" sz="1000" b="1" smtClean="0">
                 <a:solidFill>
                   <a:schemeClr val="tx2"/>
                 </a:solidFill>
               </a:rPr>
-              <a:t> vask</a:t>
+              <a:t>Identifisering</a:t>
             </a:r>
             <a:endParaRPr lang="nb-NO" sz="1000" b="1" i="1" dirty="0" smtClean="0">
               <a:solidFill>

</xml_diff>

<commit_message>
Fikset feil retning på pil i steg 2
</commit_message>
<xml_diff>
--- a/tjenestebeskrivelse/betal-fra-nettbank-datautveksling.pptx
+++ b/tjenestebeskrivelse/betal-fra-nettbank-datautveksling.pptx
@@ -214,7 +214,7 @@
           <a:p>
             <a:fld id="{0084CF28-7206-490D-88DB-D81AE5664365}" type="datetimeFigureOut">
               <a:rPr lang="en-GB" smtClean="0"/>
-              <a:t>24/08/2016</a:t>
+              <a:t>25/08/2016</a:t>
             </a:fld>
             <a:endParaRPr lang="en-GB"/>
           </a:p>
@@ -8504,7 +8504,8 @@
             <a:avLst/>
           </a:prstGeom>
           <a:ln w="12700">
-            <a:tailEnd type="arrow"/>
+            <a:headEnd type="arrow"/>
+            <a:tailEnd type="none"/>
           </a:ln>
         </p:spPr>
         <p:style>

</xml_diff>

<commit_message>
Pil i begge veier for avtaleoppsigelse. Fjernet kommentar om henting av status.
</commit_message>
<xml_diff>
--- a/tjenestebeskrivelse/betal-fra-nettbank-datautveksling.pptx
+++ b/tjenestebeskrivelse/betal-fra-nettbank-datautveksling.pptx
@@ -8943,7 +8943,7 @@
           </a:prstGeom>
           <a:ln w="12700">
             <a:headEnd type="arrow"/>
-            <a:tailEnd type="none"/>
+            <a:tailEnd type="arrow"/>
           </a:ln>
         </p:spPr>
         <p:style>
@@ -9124,7 +9124,7 @@
         <p:spPr>
           <a:xfrm>
             <a:off x="8580129" y="4072521"/>
-            <a:ext cx="1526886" cy="1969770"/>
+            <a:ext cx="1526886" cy="1100301"/>
           </a:xfrm>
           <a:prstGeom prst="rect">
             <a:avLst/>
@@ -9167,42 +9167,17 @@
                   <a:schemeClr val="tx2"/>
                 </a:solidFill>
               </a:rPr>
-              <a:t>Ny avtalestatus overføres til Digipost</a:t>
-            </a:r>
-          </a:p>
-          <a:p>
-            <a:pPr marL="171450" indent="-171450">
-              <a:spcAft>
-                <a:spcPts val="300"/>
-              </a:spcAft>
-              <a:buFont typeface="Arial" panose="020B0604020202020204" pitchFamily="34" charset="0"/>
-              <a:buChar char="•"/>
-            </a:pPr>
+              <a:t>Ny avtalestatus overføres til </a:t>
+            </a:r>
             <a:r>
               <a:rPr lang="nb-NO" sz="900" dirty="0" smtClean="0">
                 <a:solidFill>
                   <a:schemeClr val="tx2"/>
                 </a:solidFill>
               </a:rPr>
-              <a:t>Hvis avtalen avsluttes i Digipost vil banken få oppdatert status ved neste uthenting av </a:t>
-            </a:r>
-            <a:r>
-              <a:rPr lang="nb-NO" sz="900" dirty="0" err="1" smtClean="0">
-                <a:solidFill>
-                  <a:schemeClr val="tx2"/>
-                </a:solidFill>
-              </a:rPr>
-              <a:t>avtalestatus</a:t>
-            </a:r>
-            <a:r>
-              <a:rPr lang="nb-NO" sz="900" dirty="0" smtClean="0">
-                <a:solidFill>
-                  <a:schemeClr val="tx2"/>
-                </a:solidFill>
-              </a:rPr>
-              <a:t> (6)</a:t>
-            </a:r>
-            <a:endParaRPr lang="nb-NO" sz="900" dirty="0">
+              <a:t>den andre parten</a:t>
+            </a:r>
+            <a:endParaRPr lang="nb-NO" sz="900" dirty="0" smtClean="0">
               <a:solidFill>
                 <a:schemeClr val="tx2"/>
               </a:solidFill>

</xml_diff>